<commit_message>
Plot excel file data using diffrent Attributes
</commit_message>
<xml_diff>
--- a/Interactive_Visulizaiton_1.pptx
+++ b/Interactive_Visulizaiton_1.pptx
@@ -5,15 +5,19 @@
     <p:sldMasterId id="2147483668" r:id="rId1"/>
   </p:sldMasterIdLst>
   <p:notesMasterIdLst>
-    <p:notesMasterId r:id="rId5"/>
+    <p:notesMasterId r:id="rId9"/>
   </p:notesMasterIdLst>
   <p:handoutMasterIdLst>
-    <p:handoutMasterId r:id="rId6"/>
+    <p:handoutMasterId r:id="rId10"/>
   </p:handoutMasterIdLst>
   <p:sldIdLst>
     <p:sldId id="264" r:id="rId2"/>
     <p:sldId id="265" r:id="rId3"/>
     <p:sldId id="266" r:id="rId4"/>
+    <p:sldId id="267" r:id="rId5"/>
+    <p:sldId id="268" r:id="rId6"/>
+    <p:sldId id="269" r:id="rId7"/>
+    <p:sldId id="270" r:id="rId8"/>
   </p:sldIdLst>
   <p:sldSz cx="9144000" cy="6858000" type="screen4x3"/>
   <p:notesSz cx="6858000" cy="9236075"/>
@@ -487,7 +491,7 @@
               </a14:hiddenFill>
             </a:ext>
             <a:ext uri="{FAA26D3D-D897-4be2-8F04-BA451C77F1D7}">
-              <ma14:placeholderFlag xmlns:ma14="http://schemas.microsoft.com/office/mac/drawingml/2011/main" xmlns="" val="1"/>
+              <ma14:placeholderFlag xmlns="" xmlns:ma14="http://schemas.microsoft.com/office/mac/drawingml/2011/main" val="1"/>
             </a:ext>
           </a:extLst>
         </p:spPr>
@@ -1340,7 +1344,7 @@
               </a14:hiddenLine>
             </a:ext>
             <a:ext uri="{FAA26D3D-D897-4be2-8F04-BA451C77F1D7}">
-              <ma14:placeholderFlag xmlns="" xmlns:ma14="http://schemas.microsoft.com/office/mac/drawingml/2011/main" val="1"/>
+              <ma14:placeholderFlag xmlns:ma14="http://schemas.microsoft.com/office/mac/drawingml/2011/main" xmlns="" val="1"/>
             </a:ext>
           </a:extLst>
         </p:spPr>
@@ -1401,7 +1405,7 @@
               </a14:hiddenLine>
             </a:ext>
             <a:ext uri="{FAA26D3D-D897-4be2-8F04-BA451C77F1D7}">
-              <ma14:placeholderFlag xmlns="" xmlns:ma14="http://schemas.microsoft.com/office/mac/drawingml/2011/main" val="1"/>
+              <ma14:placeholderFlag xmlns:ma14="http://schemas.microsoft.com/office/mac/drawingml/2011/main" xmlns="" val="1"/>
             </a:ext>
           </a:extLst>
         </p:spPr>
@@ -2710,10 +2714,1881 @@
           </a:p>
         </p:txBody>
       </p:sp>
+      <p:sp>
+        <p:nvSpPr>
+          <p:cNvPr id="2" name="TextBox 1">
+            <a:extLst>
+              <a:ext uri="{FF2B5EF4-FFF2-40B4-BE49-F238E27FC236}">
+                <a16:creationId xmlns:a16="http://schemas.microsoft.com/office/drawing/2014/main" id="{335B3F71-F5D9-2A4A-41F9-0BD52196B76D}"/>
+              </a:ext>
+            </a:extLst>
+          </p:cNvPr>
+          <p:cNvSpPr txBox="1"/>
+          <p:nvPr/>
+        </p:nvSpPr>
+        <p:spPr>
+          <a:xfrm>
+            <a:off x="611560" y="548680"/>
+            <a:ext cx="3351046" cy="461665"/>
+          </a:xfrm>
+          <a:prstGeom prst="rect">
+            <a:avLst/>
+          </a:prstGeom>
+          <a:noFill/>
+        </p:spPr>
+        <p:txBody>
+          <a:bodyPr wrap="none" rtlCol="0">
+            <a:spAutoFit/>
+          </a:bodyPr>
+          <a:lstStyle/>
+          <a:p>
+            <a:r>
+              <a:rPr lang="en-US" b="1" dirty="0">
+                <a:solidFill>
+                  <a:srgbClr val="990033"/>
+                </a:solidFill>
+              </a:rPr>
+              <a:t>B) Plotting the Triangle </a:t>
+            </a:r>
+            <a:endParaRPr lang="en-IN" b="1" dirty="0">
+              <a:solidFill>
+                <a:srgbClr val="990033"/>
+              </a:solidFill>
+            </a:endParaRPr>
+          </a:p>
+        </p:txBody>
+      </p:sp>
+      <p:pic>
+        <p:nvPicPr>
+          <p:cNvPr id="6" name="Picture 5">
+            <a:extLst>
+              <a:ext uri="{FF2B5EF4-FFF2-40B4-BE49-F238E27FC236}">
+                <a16:creationId xmlns:a16="http://schemas.microsoft.com/office/drawing/2014/main" id="{58DCECDB-AA2F-8A44-AF9C-D0079CB6A46D}"/>
+              </a:ext>
+            </a:extLst>
+          </p:cNvPr>
+          <p:cNvPicPr>
+            <a:picLocks noChangeAspect="1"/>
+          </p:cNvPicPr>
+          <p:nvPr/>
+        </p:nvPicPr>
+        <p:blipFill>
+          <a:blip r:embed="rId2"/>
+          <a:stretch>
+            <a:fillRect/>
+          </a:stretch>
+        </p:blipFill>
+        <p:spPr>
+          <a:xfrm>
+            <a:off x="4428606" y="1196752"/>
+            <a:ext cx="4549597" cy="4536504"/>
+          </a:xfrm>
+          <a:prstGeom prst="rect">
+            <a:avLst/>
+          </a:prstGeom>
+        </p:spPr>
+      </p:pic>
+      <p:pic>
+        <p:nvPicPr>
+          <p:cNvPr id="8" name="Picture 7">
+            <a:extLst>
+              <a:ext uri="{FF2B5EF4-FFF2-40B4-BE49-F238E27FC236}">
+                <a16:creationId xmlns:a16="http://schemas.microsoft.com/office/drawing/2014/main" id="{223A66C7-66F8-8360-B7FC-9A65C57263D9}"/>
+              </a:ext>
+            </a:extLst>
+          </p:cNvPr>
+          <p:cNvPicPr>
+            <a:picLocks noChangeAspect="1"/>
+          </p:cNvPicPr>
+          <p:nvPr/>
+        </p:nvPicPr>
+        <p:blipFill>
+          <a:blip r:embed="rId3"/>
+          <a:stretch>
+            <a:fillRect/>
+          </a:stretch>
+        </p:blipFill>
+        <p:spPr>
+          <a:xfrm>
+            <a:off x="61160" y="1490392"/>
+            <a:ext cx="4115374" cy="3877216"/>
+          </a:xfrm>
+          <a:prstGeom prst="rect">
+            <a:avLst/>
+          </a:prstGeom>
+        </p:spPr>
+      </p:pic>
     </p:spTree>
     <p:extLst>
       <p:ext uri="{BB962C8B-B14F-4D97-AF65-F5344CB8AC3E}">
         <p14:creationId xmlns:p14="http://schemas.microsoft.com/office/powerpoint/2010/main" val="1732139836"/>
+      </p:ext>
+    </p:extLst>
+  </p:cSld>
+  <p:clrMapOvr>
+    <a:masterClrMapping/>
+  </p:clrMapOvr>
+</p:sld>
+</file>
+
+<file path=ppt/slides/slide4.xml><?xml version="1.0" encoding="utf-8"?>
+<p:sld xmlns:a="http://schemas.openxmlformats.org/drawingml/2006/main" xmlns:r="http://schemas.openxmlformats.org/officeDocument/2006/relationships" xmlns:p="http://schemas.openxmlformats.org/presentationml/2006/main">
+  <p:cSld>
+    <p:spTree>
+      <p:nvGrpSpPr>
+        <p:cNvPr id="1" name=""/>
+        <p:cNvGrpSpPr/>
+        <p:nvPr/>
+      </p:nvGrpSpPr>
+      <p:grpSpPr>
+        <a:xfrm>
+          <a:off x="0" y="0"/>
+          <a:ext cx="0" cy="0"/>
+          <a:chOff x="0" y="0"/>
+          <a:chExt cx="0" cy="0"/>
+        </a:xfrm>
+      </p:grpSpPr>
+      <p:sp>
+        <p:nvSpPr>
+          <p:cNvPr id="4" name="TextBox 3">
+            <a:extLst>
+              <a:ext uri="{FF2B5EF4-FFF2-40B4-BE49-F238E27FC236}">
+                <a16:creationId xmlns:a16="http://schemas.microsoft.com/office/drawing/2014/main" id="{1583F5F1-F794-FB73-839C-00B513087C0D}"/>
+              </a:ext>
+            </a:extLst>
+          </p:cNvPr>
+          <p:cNvSpPr txBox="1"/>
+          <p:nvPr/>
+        </p:nvSpPr>
+        <p:spPr>
+          <a:xfrm>
+            <a:off x="611560" y="548680"/>
+            <a:ext cx="3263266" cy="461665"/>
+          </a:xfrm>
+          <a:prstGeom prst="rect">
+            <a:avLst/>
+          </a:prstGeom>
+          <a:noFill/>
+        </p:spPr>
+        <p:txBody>
+          <a:bodyPr wrap="none" rtlCol="0">
+            <a:spAutoFit/>
+          </a:bodyPr>
+          <a:lstStyle/>
+          <a:p>
+            <a:r>
+              <a:rPr lang="en-US" b="1" dirty="0">
+                <a:solidFill>
+                  <a:srgbClr val="990033"/>
+                </a:solidFill>
+              </a:rPr>
+              <a:t>C) Plotting the Circles  </a:t>
+            </a:r>
+            <a:endParaRPr lang="en-IN" b="1" dirty="0">
+              <a:solidFill>
+                <a:srgbClr val="990033"/>
+              </a:solidFill>
+            </a:endParaRPr>
+          </a:p>
+        </p:txBody>
+      </p:sp>
+      <p:sp>
+        <p:nvSpPr>
+          <p:cNvPr id="5" name="Flowchart: Off-page Connector 4">
+            <a:extLst>
+              <a:ext uri="{FF2B5EF4-FFF2-40B4-BE49-F238E27FC236}">
+                <a16:creationId xmlns:a16="http://schemas.microsoft.com/office/drawing/2014/main" id="{9AF8328D-3000-88F7-4CBF-353B3908E189}"/>
+              </a:ext>
+            </a:extLst>
+          </p:cNvPr>
+          <p:cNvSpPr/>
+          <p:nvPr/>
+        </p:nvSpPr>
+        <p:spPr bwMode="auto">
+          <a:xfrm>
+            <a:off x="8244408" y="-11759"/>
+            <a:ext cx="490859" cy="908720"/>
+          </a:xfrm>
+          <a:prstGeom prst="flowChartOffpageConnector">
+            <a:avLst/>
+          </a:prstGeom>
+          <a:solidFill>
+            <a:schemeClr val="accent1"/>
+          </a:solidFill>
+          <a:ln w="9525" cap="flat" cmpd="sng" algn="ctr">
+            <a:solidFill>
+              <a:schemeClr val="tx1"/>
+            </a:solidFill>
+            <a:prstDash val="solid"/>
+            <a:round/>
+            <a:headEnd type="none" w="med" len="med"/>
+            <a:tailEnd type="none" w="med" len="med"/>
+          </a:ln>
+          <a:effectLst/>
+        </p:spPr>
+        <p:txBody>
+          <a:bodyPr vert="horz" wrap="square" lIns="91440" tIns="45720" rIns="91440" bIns="45720" numCol="1" rtlCol="0" anchor="t" anchorCtr="0" compatLnSpc="1">
+            <a:prstTxWarp prst="textNoShape">
+              <a:avLst/>
+            </a:prstTxWarp>
+          </a:bodyPr>
+          <a:lstStyle/>
+          <a:p>
+            <a:pPr marL="0" marR="0" indent="0" algn="l" defTabSz="914400" rtl="0" eaLnBrk="0" fontAlgn="base" latinLnBrk="0" hangingPunct="0">
+              <a:lnSpc>
+                <a:spcPct val="100000"/>
+              </a:lnSpc>
+              <a:spcBef>
+                <a:spcPct val="0"/>
+              </a:spcBef>
+              <a:spcAft>
+                <a:spcPct val="0"/>
+              </a:spcAft>
+              <a:buClrTx/>
+              <a:buSzTx/>
+              <a:buFontTx/>
+              <a:buNone/>
+              <a:tabLst/>
+            </a:pPr>
+            <a:endParaRPr kumimoji="0" lang="en-IN" sz="2400" b="0" i="0" u="none" strike="noStrike" cap="none" normalizeH="0" baseline="0" dirty="0">
+              <a:ln>
+                <a:noFill/>
+              </a:ln>
+              <a:solidFill>
+                <a:schemeClr val="tx1"/>
+              </a:solidFill>
+              <a:effectLst/>
+              <a:latin typeface="Times" pitchFamily="-32" charset="0"/>
+            </a:endParaRPr>
+          </a:p>
+        </p:txBody>
+      </p:sp>
+      <p:sp>
+        <p:nvSpPr>
+          <p:cNvPr id="6" name="TextBox 5">
+            <a:extLst>
+              <a:ext uri="{FF2B5EF4-FFF2-40B4-BE49-F238E27FC236}">
+                <a16:creationId xmlns:a16="http://schemas.microsoft.com/office/drawing/2014/main" id="{E51A16F4-355F-ED23-D504-AF19125BDE92}"/>
+              </a:ext>
+            </a:extLst>
+          </p:cNvPr>
+          <p:cNvSpPr txBox="1"/>
+          <p:nvPr/>
+        </p:nvSpPr>
+        <p:spPr>
+          <a:xfrm>
+            <a:off x="8309817" y="211768"/>
+            <a:ext cx="360040" cy="461665"/>
+          </a:xfrm>
+          <a:prstGeom prst="rect">
+            <a:avLst/>
+          </a:prstGeom>
+          <a:noFill/>
+        </p:spPr>
+        <p:txBody>
+          <a:bodyPr wrap="square" rtlCol="0">
+            <a:spAutoFit/>
+          </a:bodyPr>
+          <a:lstStyle/>
+          <a:p>
+            <a:r>
+              <a:rPr lang="en-US" b="1" dirty="0">
+                <a:solidFill>
+                  <a:schemeClr val="bg1"/>
+                </a:solidFill>
+              </a:rPr>
+              <a:t>4</a:t>
+            </a:r>
+            <a:endParaRPr lang="en-IN" b="1" dirty="0">
+              <a:solidFill>
+                <a:schemeClr val="bg1"/>
+              </a:solidFill>
+            </a:endParaRPr>
+          </a:p>
+        </p:txBody>
+      </p:sp>
+      <p:pic>
+        <p:nvPicPr>
+          <p:cNvPr id="8" name="Picture 7">
+            <a:extLst>
+              <a:ext uri="{FF2B5EF4-FFF2-40B4-BE49-F238E27FC236}">
+                <a16:creationId xmlns:a16="http://schemas.microsoft.com/office/drawing/2014/main" id="{E9FA4312-20A9-490F-DD96-4E66DB717963}"/>
+              </a:ext>
+            </a:extLst>
+          </p:cNvPr>
+          <p:cNvPicPr>
+            <a:picLocks noChangeAspect="1"/>
+          </p:cNvPicPr>
+          <p:nvPr/>
+        </p:nvPicPr>
+        <p:blipFill>
+          <a:blip r:embed="rId2"/>
+          <a:stretch>
+            <a:fillRect/>
+          </a:stretch>
+        </p:blipFill>
+        <p:spPr>
+          <a:xfrm>
+            <a:off x="4283968" y="1340768"/>
+            <a:ext cx="4562554" cy="4320407"/>
+          </a:xfrm>
+          <a:prstGeom prst="rect">
+            <a:avLst/>
+          </a:prstGeom>
+        </p:spPr>
+      </p:pic>
+      <p:pic>
+        <p:nvPicPr>
+          <p:cNvPr id="10" name="Picture 9">
+            <a:extLst>
+              <a:ext uri="{FF2B5EF4-FFF2-40B4-BE49-F238E27FC236}">
+                <a16:creationId xmlns:a16="http://schemas.microsoft.com/office/drawing/2014/main" id="{13269779-82C1-CBA3-35F9-AF3874327318}"/>
+              </a:ext>
+            </a:extLst>
+          </p:cNvPr>
+          <p:cNvPicPr>
+            <a:picLocks noChangeAspect="1"/>
+          </p:cNvPicPr>
+          <p:nvPr/>
+        </p:nvPicPr>
+        <p:blipFill>
+          <a:blip r:embed="rId3"/>
+          <a:stretch>
+            <a:fillRect/>
+          </a:stretch>
+        </p:blipFill>
+        <p:spPr>
+          <a:xfrm>
+            <a:off x="75239" y="1333207"/>
+            <a:ext cx="3781953" cy="4191585"/>
+          </a:xfrm>
+          <a:prstGeom prst="rect">
+            <a:avLst/>
+          </a:prstGeom>
+        </p:spPr>
+      </p:pic>
+    </p:spTree>
+    <p:extLst>
+      <p:ext uri="{BB962C8B-B14F-4D97-AF65-F5344CB8AC3E}">
+        <p14:creationId xmlns:p14="http://schemas.microsoft.com/office/powerpoint/2010/main" val="3998316178"/>
+      </p:ext>
+    </p:extLst>
+  </p:cSld>
+  <p:clrMapOvr>
+    <a:masterClrMapping/>
+  </p:clrMapOvr>
+</p:sld>
+</file>
+
+<file path=ppt/slides/slide5.xml><?xml version="1.0" encoding="utf-8"?>
+<p:sld xmlns:a="http://schemas.openxmlformats.org/drawingml/2006/main" xmlns:r="http://schemas.openxmlformats.org/officeDocument/2006/relationships" xmlns:p="http://schemas.openxmlformats.org/presentationml/2006/main">
+  <p:cSld>
+    <p:spTree>
+      <p:nvGrpSpPr>
+        <p:cNvPr id="1" name=""/>
+        <p:cNvGrpSpPr/>
+        <p:nvPr/>
+      </p:nvGrpSpPr>
+      <p:grpSpPr>
+        <a:xfrm>
+          <a:off x="0" y="0"/>
+          <a:ext cx="0" cy="0"/>
+          <a:chOff x="0" y="0"/>
+          <a:chExt cx="0" cy="0"/>
+        </a:xfrm>
+      </p:grpSpPr>
+      <p:sp>
+        <p:nvSpPr>
+          <p:cNvPr id="4" name="TextBox 3">
+            <a:extLst>
+              <a:ext uri="{FF2B5EF4-FFF2-40B4-BE49-F238E27FC236}">
+                <a16:creationId xmlns:a16="http://schemas.microsoft.com/office/drawing/2014/main" id="{B4F4F2D4-8DD0-5278-3DCF-48E9D43D6CC3}"/>
+              </a:ext>
+            </a:extLst>
+          </p:cNvPr>
+          <p:cNvSpPr txBox="1"/>
+          <p:nvPr/>
+        </p:nvSpPr>
+        <p:spPr>
+          <a:xfrm>
+            <a:off x="611560" y="548680"/>
+            <a:ext cx="4027064" cy="461665"/>
+          </a:xfrm>
+          <a:prstGeom prst="rect">
+            <a:avLst/>
+          </a:prstGeom>
+          <a:noFill/>
+        </p:spPr>
+        <p:txBody>
+          <a:bodyPr wrap="none" rtlCol="0">
+            <a:spAutoFit/>
+          </a:bodyPr>
+          <a:lstStyle/>
+          <a:p>
+            <a:r>
+              <a:rPr lang="en-US" b="1" dirty="0">
+                <a:solidFill>
+                  <a:srgbClr val="990033"/>
+                </a:solidFill>
+              </a:rPr>
+              <a:t>D) Using Bokeh with Pandas </a:t>
+            </a:r>
+            <a:endParaRPr lang="en-IN" b="1" dirty="0">
+              <a:solidFill>
+                <a:srgbClr val="990033"/>
+              </a:solidFill>
+            </a:endParaRPr>
+          </a:p>
+        </p:txBody>
+      </p:sp>
+      <p:sp>
+        <p:nvSpPr>
+          <p:cNvPr id="5" name="Flowchart: Off-page Connector 4">
+            <a:extLst>
+              <a:ext uri="{FF2B5EF4-FFF2-40B4-BE49-F238E27FC236}">
+                <a16:creationId xmlns:a16="http://schemas.microsoft.com/office/drawing/2014/main" id="{03A1110D-F9B0-CB67-04E4-37A7B86D4943}"/>
+              </a:ext>
+            </a:extLst>
+          </p:cNvPr>
+          <p:cNvSpPr/>
+          <p:nvPr/>
+        </p:nvSpPr>
+        <p:spPr bwMode="auto">
+          <a:xfrm>
+            <a:off x="8244408" y="-11759"/>
+            <a:ext cx="490859" cy="908720"/>
+          </a:xfrm>
+          <a:prstGeom prst="flowChartOffpageConnector">
+            <a:avLst/>
+          </a:prstGeom>
+          <a:solidFill>
+            <a:schemeClr val="accent1"/>
+          </a:solidFill>
+          <a:ln w="9525" cap="flat" cmpd="sng" algn="ctr">
+            <a:solidFill>
+              <a:schemeClr val="tx1"/>
+            </a:solidFill>
+            <a:prstDash val="solid"/>
+            <a:round/>
+            <a:headEnd type="none" w="med" len="med"/>
+            <a:tailEnd type="none" w="med" len="med"/>
+          </a:ln>
+          <a:effectLst/>
+        </p:spPr>
+        <p:txBody>
+          <a:bodyPr vert="horz" wrap="square" lIns="91440" tIns="45720" rIns="91440" bIns="45720" numCol="1" rtlCol="0" anchor="t" anchorCtr="0" compatLnSpc="1">
+            <a:prstTxWarp prst="textNoShape">
+              <a:avLst/>
+            </a:prstTxWarp>
+          </a:bodyPr>
+          <a:lstStyle/>
+          <a:p>
+            <a:pPr marL="0" marR="0" indent="0" algn="l" defTabSz="914400" rtl="0" eaLnBrk="0" fontAlgn="base" latinLnBrk="0" hangingPunct="0">
+              <a:lnSpc>
+                <a:spcPct val="100000"/>
+              </a:lnSpc>
+              <a:spcBef>
+                <a:spcPct val="0"/>
+              </a:spcBef>
+              <a:spcAft>
+                <a:spcPct val="0"/>
+              </a:spcAft>
+              <a:buClrTx/>
+              <a:buSzTx/>
+              <a:buFontTx/>
+              <a:buNone/>
+              <a:tabLst/>
+            </a:pPr>
+            <a:endParaRPr kumimoji="0" lang="en-IN" sz="2400" b="0" i="0" u="none" strike="noStrike" cap="none" normalizeH="0" baseline="0" dirty="0">
+              <a:ln>
+                <a:noFill/>
+              </a:ln>
+              <a:solidFill>
+                <a:schemeClr val="tx1"/>
+              </a:solidFill>
+              <a:effectLst/>
+              <a:latin typeface="Times" pitchFamily="-32" charset="0"/>
+            </a:endParaRPr>
+          </a:p>
+        </p:txBody>
+      </p:sp>
+      <p:sp>
+        <p:nvSpPr>
+          <p:cNvPr id="6" name="TextBox 5">
+            <a:extLst>
+              <a:ext uri="{FF2B5EF4-FFF2-40B4-BE49-F238E27FC236}">
+                <a16:creationId xmlns:a16="http://schemas.microsoft.com/office/drawing/2014/main" id="{5554999C-0CF5-4F46-FD8A-D826329C477C}"/>
+              </a:ext>
+            </a:extLst>
+          </p:cNvPr>
+          <p:cNvSpPr txBox="1"/>
+          <p:nvPr/>
+        </p:nvSpPr>
+        <p:spPr>
+          <a:xfrm>
+            <a:off x="8309817" y="211768"/>
+            <a:ext cx="360040" cy="461665"/>
+          </a:xfrm>
+          <a:prstGeom prst="rect">
+            <a:avLst/>
+          </a:prstGeom>
+          <a:noFill/>
+        </p:spPr>
+        <p:txBody>
+          <a:bodyPr wrap="square" rtlCol="0">
+            <a:spAutoFit/>
+          </a:bodyPr>
+          <a:lstStyle/>
+          <a:p>
+            <a:r>
+              <a:rPr lang="en-US" b="1" dirty="0">
+                <a:solidFill>
+                  <a:schemeClr val="bg1"/>
+                </a:solidFill>
+              </a:rPr>
+              <a:t>5</a:t>
+            </a:r>
+            <a:endParaRPr lang="en-IN" b="1" dirty="0">
+              <a:solidFill>
+                <a:schemeClr val="bg1"/>
+              </a:solidFill>
+            </a:endParaRPr>
+          </a:p>
+        </p:txBody>
+      </p:sp>
+      <p:sp>
+        <p:nvSpPr>
+          <p:cNvPr id="9" name="TextBox 8">
+            <a:extLst>
+              <a:ext uri="{FF2B5EF4-FFF2-40B4-BE49-F238E27FC236}">
+                <a16:creationId xmlns:a16="http://schemas.microsoft.com/office/drawing/2014/main" id="{980F7F05-1FF8-62E7-C471-A9C92B004ACD}"/>
+              </a:ext>
+            </a:extLst>
+          </p:cNvPr>
+          <p:cNvSpPr txBox="1"/>
+          <p:nvPr/>
+        </p:nvSpPr>
+        <p:spPr>
+          <a:xfrm>
+            <a:off x="467544" y="5877272"/>
+            <a:ext cx="5102679" cy="707886"/>
+          </a:xfrm>
+          <a:prstGeom prst="rect">
+            <a:avLst/>
+          </a:prstGeom>
+          <a:noFill/>
+        </p:spPr>
+        <p:txBody>
+          <a:bodyPr wrap="none" rtlCol="0">
+            <a:spAutoFit/>
+          </a:bodyPr>
+          <a:lstStyle/>
+          <a:p>
+            <a:r>
+              <a:rPr lang="en-US" sz="2000" b="1" dirty="0"/>
+              <a:t>Resources - </a:t>
+            </a:r>
+            <a:r>
+              <a:rPr lang="en-US" sz="2000" b="1" dirty="0">
+                <a:hlinkClick r:id="rId2"/>
+              </a:rPr>
+              <a:t>https://docs.bokeh.org/en/latest/</a:t>
+            </a:r>
+            <a:r>
+              <a:rPr lang="en-US" sz="2000" b="1" dirty="0"/>
+              <a:t> </a:t>
+            </a:r>
+          </a:p>
+          <a:p>
+            <a:r>
+              <a:rPr lang="en-IN" sz="2000" b="1" dirty="0"/>
+              <a:t>                      </a:t>
+            </a:r>
+            <a:r>
+              <a:rPr lang="en-IN" sz="2000" b="1" dirty="0">
+                <a:hlinkClick r:id="rId3"/>
+              </a:rPr>
+              <a:t>https://pandas.pydata.org/docs/</a:t>
+            </a:r>
+            <a:r>
+              <a:rPr lang="en-IN" sz="2000" b="1" dirty="0"/>
+              <a:t> </a:t>
+            </a:r>
+          </a:p>
+        </p:txBody>
+      </p:sp>
+      <p:pic>
+        <p:nvPicPr>
+          <p:cNvPr id="11" name="Picture 10">
+            <a:extLst>
+              <a:ext uri="{FF2B5EF4-FFF2-40B4-BE49-F238E27FC236}">
+                <a16:creationId xmlns:a16="http://schemas.microsoft.com/office/drawing/2014/main" id="{9F5B2329-19A3-1163-A234-105345E0D1CD}"/>
+              </a:ext>
+            </a:extLst>
+          </p:cNvPr>
+          <p:cNvPicPr>
+            <a:picLocks noChangeAspect="1"/>
+          </p:cNvPicPr>
+          <p:nvPr/>
+        </p:nvPicPr>
+        <p:blipFill>
+          <a:blip r:embed="rId4"/>
+          <a:stretch>
+            <a:fillRect/>
+          </a:stretch>
+        </p:blipFill>
+        <p:spPr>
+          <a:xfrm>
+            <a:off x="5459329" y="919830"/>
+            <a:ext cx="3030508" cy="2937780"/>
+          </a:xfrm>
+          <a:prstGeom prst="rect">
+            <a:avLst/>
+          </a:prstGeom>
+        </p:spPr>
+      </p:pic>
+      <p:sp>
+        <p:nvSpPr>
+          <p:cNvPr id="12" name="TextBox 11">
+            <a:extLst>
+              <a:ext uri="{FF2B5EF4-FFF2-40B4-BE49-F238E27FC236}">
+                <a16:creationId xmlns:a16="http://schemas.microsoft.com/office/drawing/2014/main" id="{5F174C78-3AF0-A51D-6FB7-D1D1E59A67AF}"/>
+              </a:ext>
+            </a:extLst>
+          </p:cNvPr>
+          <p:cNvSpPr txBox="1"/>
+          <p:nvPr/>
+        </p:nvSpPr>
+        <p:spPr>
+          <a:xfrm>
+            <a:off x="360641" y="1268760"/>
+            <a:ext cx="4381712" cy="400110"/>
+          </a:xfrm>
+          <a:prstGeom prst="rect">
+            <a:avLst/>
+          </a:prstGeom>
+          <a:noFill/>
+        </p:spPr>
+        <p:txBody>
+          <a:bodyPr wrap="none" rtlCol="0">
+            <a:spAutoFit/>
+          </a:bodyPr>
+          <a:lstStyle/>
+          <a:p>
+            <a:r>
+              <a:rPr lang="en-US" sz="2000" b="1" u="sng" dirty="0"/>
+              <a:t># Importing Data From the CSV file :-</a:t>
+            </a:r>
+            <a:endParaRPr lang="en-IN" sz="2000" b="1" u="sng" dirty="0"/>
+          </a:p>
+        </p:txBody>
+      </p:sp>
+      <p:pic>
+        <p:nvPicPr>
+          <p:cNvPr id="14" name="Picture 13">
+            <a:extLst>
+              <a:ext uri="{FF2B5EF4-FFF2-40B4-BE49-F238E27FC236}">
+                <a16:creationId xmlns:a16="http://schemas.microsoft.com/office/drawing/2014/main" id="{ED5378C1-3A23-D67C-DA16-B7561D4E3EFE}"/>
+              </a:ext>
+            </a:extLst>
+          </p:cNvPr>
+          <p:cNvPicPr>
+            <a:picLocks noChangeAspect="1"/>
+          </p:cNvPicPr>
+          <p:nvPr/>
+        </p:nvPicPr>
+        <p:blipFill>
+          <a:blip r:embed="rId5"/>
+          <a:stretch>
+            <a:fillRect/>
+          </a:stretch>
+        </p:blipFill>
+        <p:spPr>
+          <a:xfrm>
+            <a:off x="5241434" y="4077237"/>
+            <a:ext cx="3596401" cy="1728027"/>
+          </a:xfrm>
+          <a:prstGeom prst="rect">
+            <a:avLst/>
+          </a:prstGeom>
+        </p:spPr>
+      </p:pic>
+      <p:sp>
+        <p:nvSpPr>
+          <p:cNvPr id="15" name="TextBox 14">
+            <a:extLst>
+              <a:ext uri="{FF2B5EF4-FFF2-40B4-BE49-F238E27FC236}">
+                <a16:creationId xmlns:a16="http://schemas.microsoft.com/office/drawing/2014/main" id="{008A7826-6B72-D4F7-94C0-2F91D6E8A547}"/>
+              </a:ext>
+            </a:extLst>
+          </p:cNvPr>
+          <p:cNvSpPr txBox="1"/>
+          <p:nvPr/>
+        </p:nvSpPr>
+        <p:spPr>
+          <a:xfrm>
+            <a:off x="6444208" y="5805264"/>
+            <a:ext cx="1737976" cy="461665"/>
+          </a:xfrm>
+          <a:prstGeom prst="rect">
+            <a:avLst/>
+          </a:prstGeom>
+          <a:noFill/>
+        </p:spPr>
+        <p:txBody>
+          <a:bodyPr wrap="none" rtlCol="0">
+            <a:spAutoFit/>
+          </a:bodyPr>
+          <a:lstStyle/>
+          <a:p>
+            <a:r>
+              <a:rPr lang="en-US" u="sng" dirty="0"/>
+              <a:t>Csv file data</a:t>
+            </a:r>
+            <a:endParaRPr lang="en-IN" u="sng" dirty="0"/>
+          </a:p>
+        </p:txBody>
+      </p:sp>
+      <p:pic>
+        <p:nvPicPr>
+          <p:cNvPr id="17" name="Picture 16">
+            <a:extLst>
+              <a:ext uri="{FF2B5EF4-FFF2-40B4-BE49-F238E27FC236}">
+                <a16:creationId xmlns:a16="http://schemas.microsoft.com/office/drawing/2014/main" id="{3C3C3AB4-8635-5C35-D417-5016CED77383}"/>
+              </a:ext>
+            </a:extLst>
+          </p:cNvPr>
+          <p:cNvPicPr>
+            <a:picLocks noChangeAspect="1"/>
+          </p:cNvPicPr>
+          <p:nvPr/>
+        </p:nvPicPr>
+        <p:blipFill>
+          <a:blip r:embed="rId6"/>
+          <a:stretch>
+            <a:fillRect/>
+          </a:stretch>
+        </p:blipFill>
+        <p:spPr>
+          <a:xfrm>
+            <a:off x="422004" y="1668871"/>
+            <a:ext cx="3041366" cy="4208402"/>
+          </a:xfrm>
+          <a:prstGeom prst="rect">
+            <a:avLst/>
+          </a:prstGeom>
+        </p:spPr>
+      </p:pic>
+    </p:spTree>
+    <p:extLst>
+      <p:ext uri="{BB962C8B-B14F-4D97-AF65-F5344CB8AC3E}">
+        <p14:creationId xmlns:p14="http://schemas.microsoft.com/office/powerpoint/2010/main" val="4272168585"/>
+      </p:ext>
+    </p:extLst>
+  </p:cSld>
+  <p:clrMapOvr>
+    <a:masterClrMapping/>
+  </p:clrMapOvr>
+</p:sld>
+</file>
+
+<file path=ppt/slides/slide6.xml><?xml version="1.0" encoding="utf-8"?>
+<p:sld xmlns:a="http://schemas.openxmlformats.org/drawingml/2006/main" xmlns:r="http://schemas.openxmlformats.org/officeDocument/2006/relationships" xmlns:p="http://schemas.openxmlformats.org/presentationml/2006/main">
+  <p:cSld>
+    <p:spTree>
+      <p:nvGrpSpPr>
+        <p:cNvPr id="1" name=""/>
+        <p:cNvGrpSpPr/>
+        <p:nvPr/>
+      </p:nvGrpSpPr>
+      <p:grpSpPr>
+        <a:xfrm>
+          <a:off x="0" y="0"/>
+          <a:ext cx="0" cy="0"/>
+          <a:chOff x="0" y="0"/>
+          <a:chExt cx="0" cy="0"/>
+        </a:xfrm>
+      </p:grpSpPr>
+      <p:sp>
+        <p:nvSpPr>
+          <p:cNvPr id="6" name="Flowchart: Off-page Connector 5">
+            <a:extLst>
+              <a:ext uri="{FF2B5EF4-FFF2-40B4-BE49-F238E27FC236}">
+                <a16:creationId xmlns:a16="http://schemas.microsoft.com/office/drawing/2014/main" id="{A669DE97-C867-676E-7656-32278BDF963C}"/>
+              </a:ext>
+            </a:extLst>
+          </p:cNvPr>
+          <p:cNvSpPr/>
+          <p:nvPr/>
+        </p:nvSpPr>
+        <p:spPr bwMode="auto">
+          <a:xfrm>
+            <a:off x="8244408" y="-11759"/>
+            <a:ext cx="490859" cy="908720"/>
+          </a:xfrm>
+          <a:prstGeom prst="flowChartOffpageConnector">
+            <a:avLst/>
+          </a:prstGeom>
+          <a:solidFill>
+            <a:schemeClr val="accent1"/>
+          </a:solidFill>
+          <a:ln w="9525" cap="flat" cmpd="sng" algn="ctr">
+            <a:solidFill>
+              <a:schemeClr val="tx1"/>
+            </a:solidFill>
+            <a:prstDash val="solid"/>
+            <a:round/>
+            <a:headEnd type="none" w="med" len="med"/>
+            <a:tailEnd type="none" w="med" len="med"/>
+          </a:ln>
+          <a:effectLst/>
+        </p:spPr>
+        <p:txBody>
+          <a:bodyPr vert="horz" wrap="square" lIns="91440" tIns="45720" rIns="91440" bIns="45720" numCol="1" rtlCol="0" anchor="t" anchorCtr="0" compatLnSpc="1">
+            <a:prstTxWarp prst="textNoShape">
+              <a:avLst/>
+            </a:prstTxWarp>
+          </a:bodyPr>
+          <a:lstStyle/>
+          <a:p>
+            <a:pPr marL="0" marR="0" indent="0" algn="l" defTabSz="914400" rtl="0" eaLnBrk="0" fontAlgn="base" latinLnBrk="0" hangingPunct="0">
+              <a:lnSpc>
+                <a:spcPct val="100000"/>
+              </a:lnSpc>
+              <a:spcBef>
+                <a:spcPct val="0"/>
+              </a:spcBef>
+              <a:spcAft>
+                <a:spcPct val="0"/>
+              </a:spcAft>
+              <a:buClrTx/>
+              <a:buSzTx/>
+              <a:buFontTx/>
+              <a:buNone/>
+              <a:tabLst/>
+            </a:pPr>
+            <a:endParaRPr kumimoji="0" lang="en-IN" sz="2400" b="0" i="0" u="none" strike="noStrike" cap="none" normalizeH="0" baseline="0" dirty="0">
+              <a:ln>
+                <a:noFill/>
+              </a:ln>
+              <a:solidFill>
+                <a:schemeClr val="tx1"/>
+              </a:solidFill>
+              <a:effectLst/>
+              <a:latin typeface="Times" pitchFamily="-32" charset="0"/>
+            </a:endParaRPr>
+          </a:p>
+        </p:txBody>
+      </p:sp>
+      <p:sp>
+        <p:nvSpPr>
+          <p:cNvPr id="7" name="TextBox 6">
+            <a:extLst>
+              <a:ext uri="{FF2B5EF4-FFF2-40B4-BE49-F238E27FC236}">
+                <a16:creationId xmlns:a16="http://schemas.microsoft.com/office/drawing/2014/main" id="{01A7A560-7C42-B520-9A2C-CE6FDBBDFEAA}"/>
+              </a:ext>
+            </a:extLst>
+          </p:cNvPr>
+          <p:cNvSpPr txBox="1"/>
+          <p:nvPr/>
+        </p:nvSpPr>
+        <p:spPr>
+          <a:xfrm>
+            <a:off x="8309817" y="211768"/>
+            <a:ext cx="360040" cy="461665"/>
+          </a:xfrm>
+          <a:prstGeom prst="rect">
+            <a:avLst/>
+          </a:prstGeom>
+          <a:noFill/>
+        </p:spPr>
+        <p:txBody>
+          <a:bodyPr wrap="square" rtlCol="0">
+            <a:spAutoFit/>
+          </a:bodyPr>
+          <a:lstStyle/>
+          <a:p>
+            <a:r>
+              <a:rPr lang="en-US" b="1" dirty="0">
+                <a:solidFill>
+                  <a:schemeClr val="bg1"/>
+                </a:solidFill>
+              </a:rPr>
+              <a:t>6</a:t>
+            </a:r>
+            <a:endParaRPr lang="en-IN" b="1" dirty="0">
+              <a:solidFill>
+                <a:schemeClr val="bg1"/>
+              </a:solidFill>
+            </a:endParaRPr>
+          </a:p>
+        </p:txBody>
+      </p:sp>
+      <p:sp>
+        <p:nvSpPr>
+          <p:cNvPr id="8" name="TextBox 7">
+            <a:extLst>
+              <a:ext uri="{FF2B5EF4-FFF2-40B4-BE49-F238E27FC236}">
+                <a16:creationId xmlns:a16="http://schemas.microsoft.com/office/drawing/2014/main" id="{18FD3B5F-5E30-4E9D-D62D-D8EA24298712}"/>
+              </a:ext>
+            </a:extLst>
+          </p:cNvPr>
+          <p:cNvSpPr txBox="1"/>
+          <p:nvPr/>
+        </p:nvSpPr>
+        <p:spPr>
+          <a:xfrm>
+            <a:off x="155516" y="1986009"/>
+            <a:ext cx="6329874" cy="707886"/>
+          </a:xfrm>
+          <a:prstGeom prst="rect">
+            <a:avLst/>
+          </a:prstGeom>
+          <a:noFill/>
+        </p:spPr>
+        <p:txBody>
+          <a:bodyPr wrap="none" rtlCol="0">
+            <a:spAutoFit/>
+          </a:bodyPr>
+          <a:lstStyle/>
+          <a:p>
+            <a:r>
+              <a:rPr lang="en-US" sz="2000" dirty="0"/>
+              <a:t>Csv File - </a:t>
+            </a:r>
+            <a:r>
+              <a:rPr lang="en-IN" sz="2000" b="0" i="0" u="sng" dirty="0">
+                <a:solidFill>
+                  <a:srgbClr val="5624D0"/>
+                </a:solidFill>
+                <a:effectLst/>
+                <a:latin typeface="udemy sans"/>
+                <a:hlinkClick r:id="rId2"/>
+              </a:rPr>
+              <a:t>https://pythonizing.github.io/data/bachelors.csv</a:t>
+            </a:r>
+            <a:endParaRPr lang="en-IN" sz="2000" dirty="0"/>
+          </a:p>
+          <a:p>
+            <a:endParaRPr lang="en-IN" sz="2000" dirty="0"/>
+          </a:p>
+        </p:txBody>
+      </p:sp>
+      <p:sp>
+        <p:nvSpPr>
+          <p:cNvPr id="10" name="TextBox 9">
+            <a:extLst>
+              <a:ext uri="{FF2B5EF4-FFF2-40B4-BE49-F238E27FC236}">
+                <a16:creationId xmlns:a16="http://schemas.microsoft.com/office/drawing/2014/main" id="{BDD74EF0-1E32-C4F5-27A0-73AB36E5BFE1}"/>
+              </a:ext>
+            </a:extLst>
+          </p:cNvPr>
+          <p:cNvSpPr txBox="1"/>
+          <p:nvPr/>
+        </p:nvSpPr>
+        <p:spPr>
+          <a:xfrm>
+            <a:off x="155516" y="435296"/>
+            <a:ext cx="6288692" cy="461665"/>
+          </a:xfrm>
+          <a:prstGeom prst="rect">
+            <a:avLst/>
+          </a:prstGeom>
+          <a:noFill/>
+        </p:spPr>
+        <p:txBody>
+          <a:bodyPr wrap="square">
+            <a:spAutoFit/>
+          </a:bodyPr>
+          <a:lstStyle/>
+          <a:p>
+            <a:r>
+              <a:rPr lang="en-US" b="1" dirty="0">
+                <a:solidFill>
+                  <a:srgbClr val="990033"/>
+                </a:solidFill>
+              </a:rPr>
+              <a:t>E) Plot the Data </a:t>
+            </a:r>
+            <a:r>
+              <a:rPr lang="en-US" b="1" dirty="0" err="1">
+                <a:solidFill>
+                  <a:srgbClr val="990033"/>
+                </a:solidFill>
+              </a:rPr>
+              <a:t>ufrom</a:t>
+            </a:r>
+            <a:r>
+              <a:rPr lang="en-US" b="1" dirty="0">
+                <a:solidFill>
+                  <a:srgbClr val="990033"/>
+                </a:solidFill>
+              </a:rPr>
+              <a:t> CSV using the Bokeh</a:t>
+            </a:r>
+            <a:endParaRPr lang="en-IN" b="1" dirty="0">
+              <a:solidFill>
+                <a:srgbClr val="990033"/>
+              </a:solidFill>
+            </a:endParaRPr>
+          </a:p>
+        </p:txBody>
+      </p:sp>
+      <p:pic>
+        <p:nvPicPr>
+          <p:cNvPr id="12" name="Picture 11">
+            <a:extLst>
+              <a:ext uri="{FF2B5EF4-FFF2-40B4-BE49-F238E27FC236}">
+                <a16:creationId xmlns:a16="http://schemas.microsoft.com/office/drawing/2014/main" id="{93340F28-29B4-8F74-C6C5-3796FBDA240A}"/>
+              </a:ext>
+            </a:extLst>
+          </p:cNvPr>
+          <p:cNvPicPr>
+            <a:picLocks noChangeAspect="1"/>
+          </p:cNvPicPr>
+          <p:nvPr/>
+        </p:nvPicPr>
+        <p:blipFill>
+          <a:blip r:embed="rId3"/>
+          <a:stretch>
+            <a:fillRect/>
+          </a:stretch>
+        </p:blipFill>
+        <p:spPr>
+          <a:xfrm>
+            <a:off x="155516" y="957165"/>
+            <a:ext cx="5020376" cy="1028844"/>
+          </a:xfrm>
+          <a:prstGeom prst="rect">
+            <a:avLst/>
+          </a:prstGeom>
+        </p:spPr>
+      </p:pic>
+      <p:pic>
+        <p:nvPicPr>
+          <p:cNvPr id="16" name="Picture 15">
+            <a:extLst>
+              <a:ext uri="{FF2B5EF4-FFF2-40B4-BE49-F238E27FC236}">
+                <a16:creationId xmlns:a16="http://schemas.microsoft.com/office/drawing/2014/main" id="{FBBD52FB-09AA-0758-DBEC-80EB1DCA24C3}"/>
+              </a:ext>
+            </a:extLst>
+          </p:cNvPr>
+          <p:cNvPicPr>
+            <a:picLocks noChangeAspect="1"/>
+          </p:cNvPicPr>
+          <p:nvPr/>
+        </p:nvPicPr>
+        <p:blipFill>
+          <a:blip r:embed="rId4"/>
+          <a:stretch>
+            <a:fillRect/>
+          </a:stretch>
+        </p:blipFill>
+        <p:spPr>
+          <a:xfrm>
+            <a:off x="5175892" y="2564904"/>
+            <a:ext cx="3706522" cy="3744343"/>
+          </a:xfrm>
+          <a:prstGeom prst="rect">
+            <a:avLst/>
+          </a:prstGeom>
+        </p:spPr>
+      </p:pic>
+      <p:pic>
+        <p:nvPicPr>
+          <p:cNvPr id="18" name="Picture 17">
+            <a:extLst>
+              <a:ext uri="{FF2B5EF4-FFF2-40B4-BE49-F238E27FC236}">
+                <a16:creationId xmlns:a16="http://schemas.microsoft.com/office/drawing/2014/main" id="{9BA6A668-CCEB-619D-C1FB-80C58B73F14E}"/>
+              </a:ext>
+            </a:extLst>
+          </p:cNvPr>
+          <p:cNvPicPr>
+            <a:picLocks noChangeAspect="1"/>
+          </p:cNvPicPr>
+          <p:nvPr/>
+        </p:nvPicPr>
+        <p:blipFill>
+          <a:blip r:embed="rId5"/>
+          <a:stretch>
+            <a:fillRect/>
+          </a:stretch>
+        </p:blipFill>
+        <p:spPr>
+          <a:xfrm>
+            <a:off x="326458" y="2457641"/>
+            <a:ext cx="2993995" cy="4093484"/>
+          </a:xfrm>
+          <a:prstGeom prst="rect">
+            <a:avLst/>
+          </a:prstGeom>
+        </p:spPr>
+      </p:pic>
+    </p:spTree>
+    <p:extLst>
+      <p:ext uri="{BB962C8B-B14F-4D97-AF65-F5344CB8AC3E}">
+        <p14:creationId xmlns:p14="http://schemas.microsoft.com/office/powerpoint/2010/main" val="78134171"/>
+      </p:ext>
+    </p:extLst>
+  </p:cSld>
+  <p:clrMapOvr>
+    <a:masterClrMapping/>
+  </p:clrMapOvr>
+</p:sld>
+</file>
+
+<file path=ppt/slides/slide7.xml><?xml version="1.0" encoding="utf-8"?>
+<p:sld xmlns:a="http://schemas.openxmlformats.org/drawingml/2006/main" xmlns:r="http://schemas.openxmlformats.org/officeDocument/2006/relationships" xmlns:p="http://schemas.openxmlformats.org/presentationml/2006/main">
+  <p:cSld>
+    <p:spTree>
+      <p:nvGrpSpPr>
+        <p:cNvPr id="1" name=""/>
+        <p:cNvGrpSpPr/>
+        <p:nvPr/>
+      </p:nvGrpSpPr>
+      <p:grpSpPr>
+        <a:xfrm>
+          <a:off x="0" y="0"/>
+          <a:ext cx="0" cy="0"/>
+          <a:chOff x="0" y="0"/>
+          <a:chExt cx="0" cy="0"/>
+        </a:xfrm>
+      </p:grpSpPr>
+      <p:sp>
+        <p:nvSpPr>
+          <p:cNvPr id="4" name="Flowchart: Off-page Connector 3">
+            <a:extLst>
+              <a:ext uri="{FF2B5EF4-FFF2-40B4-BE49-F238E27FC236}">
+                <a16:creationId xmlns:a16="http://schemas.microsoft.com/office/drawing/2014/main" id="{A6A4FB8C-D596-D07A-533B-8CC6B338BED8}"/>
+              </a:ext>
+            </a:extLst>
+          </p:cNvPr>
+          <p:cNvSpPr/>
+          <p:nvPr/>
+        </p:nvSpPr>
+        <p:spPr bwMode="auto">
+          <a:xfrm>
+            <a:off x="8244408" y="-11759"/>
+            <a:ext cx="490859" cy="908720"/>
+          </a:xfrm>
+          <a:prstGeom prst="flowChartOffpageConnector">
+            <a:avLst/>
+          </a:prstGeom>
+          <a:solidFill>
+            <a:schemeClr val="accent1"/>
+          </a:solidFill>
+          <a:ln w="9525" cap="flat" cmpd="sng" algn="ctr">
+            <a:solidFill>
+              <a:schemeClr val="tx1"/>
+            </a:solidFill>
+            <a:prstDash val="solid"/>
+            <a:round/>
+            <a:headEnd type="none" w="med" len="med"/>
+            <a:tailEnd type="none" w="med" len="med"/>
+          </a:ln>
+          <a:effectLst/>
+        </p:spPr>
+        <p:txBody>
+          <a:bodyPr vert="horz" wrap="square" lIns="91440" tIns="45720" rIns="91440" bIns="45720" numCol="1" rtlCol="0" anchor="t" anchorCtr="0" compatLnSpc="1">
+            <a:prstTxWarp prst="textNoShape">
+              <a:avLst/>
+            </a:prstTxWarp>
+          </a:bodyPr>
+          <a:lstStyle/>
+          <a:p>
+            <a:pPr marL="0" marR="0" indent="0" algn="l" defTabSz="914400" rtl="0" eaLnBrk="0" fontAlgn="base" latinLnBrk="0" hangingPunct="0">
+              <a:lnSpc>
+                <a:spcPct val="100000"/>
+              </a:lnSpc>
+              <a:spcBef>
+                <a:spcPct val="0"/>
+              </a:spcBef>
+              <a:spcAft>
+                <a:spcPct val="0"/>
+              </a:spcAft>
+              <a:buClrTx/>
+              <a:buSzTx/>
+              <a:buFontTx/>
+              <a:buNone/>
+              <a:tabLst/>
+            </a:pPr>
+            <a:endParaRPr kumimoji="0" lang="en-IN" sz="2400" b="0" i="0" u="none" strike="noStrike" cap="none" normalizeH="0" baseline="0" dirty="0">
+              <a:ln>
+                <a:noFill/>
+              </a:ln>
+              <a:solidFill>
+                <a:schemeClr val="tx1"/>
+              </a:solidFill>
+              <a:effectLst/>
+              <a:latin typeface="Times" pitchFamily="-32" charset="0"/>
+            </a:endParaRPr>
+          </a:p>
+        </p:txBody>
+      </p:sp>
+      <p:sp>
+        <p:nvSpPr>
+          <p:cNvPr id="5" name="TextBox 4">
+            <a:extLst>
+              <a:ext uri="{FF2B5EF4-FFF2-40B4-BE49-F238E27FC236}">
+                <a16:creationId xmlns:a16="http://schemas.microsoft.com/office/drawing/2014/main" id="{6C14B04E-57F2-54DE-C833-083B63AD20BF}"/>
+              </a:ext>
+            </a:extLst>
+          </p:cNvPr>
+          <p:cNvSpPr txBox="1"/>
+          <p:nvPr/>
+        </p:nvSpPr>
+        <p:spPr>
+          <a:xfrm>
+            <a:off x="8309817" y="211768"/>
+            <a:ext cx="360040" cy="461665"/>
+          </a:xfrm>
+          <a:prstGeom prst="rect">
+            <a:avLst/>
+          </a:prstGeom>
+          <a:noFill/>
+        </p:spPr>
+        <p:txBody>
+          <a:bodyPr wrap="square" rtlCol="0">
+            <a:spAutoFit/>
+          </a:bodyPr>
+          <a:lstStyle/>
+          <a:p>
+            <a:r>
+              <a:rPr lang="en-US" b="1" dirty="0">
+                <a:solidFill>
+                  <a:schemeClr val="bg1"/>
+                </a:solidFill>
+              </a:rPr>
+              <a:t>6</a:t>
+            </a:r>
+            <a:endParaRPr lang="en-IN" b="1" dirty="0">
+              <a:solidFill>
+                <a:schemeClr val="bg1"/>
+              </a:solidFill>
+            </a:endParaRPr>
+          </a:p>
+        </p:txBody>
+      </p:sp>
+      <p:sp>
+        <p:nvSpPr>
+          <p:cNvPr id="7" name="TextBox 6">
+            <a:extLst>
+              <a:ext uri="{FF2B5EF4-FFF2-40B4-BE49-F238E27FC236}">
+                <a16:creationId xmlns:a16="http://schemas.microsoft.com/office/drawing/2014/main" id="{56953D04-419F-C914-174C-849B8A62B355}"/>
+              </a:ext>
+            </a:extLst>
+          </p:cNvPr>
+          <p:cNvSpPr txBox="1"/>
+          <p:nvPr/>
+        </p:nvSpPr>
+        <p:spPr>
+          <a:xfrm>
+            <a:off x="251520" y="442600"/>
+            <a:ext cx="6912768" cy="461665"/>
+          </a:xfrm>
+          <a:prstGeom prst="rect">
+            <a:avLst/>
+          </a:prstGeom>
+          <a:noFill/>
+        </p:spPr>
+        <p:txBody>
+          <a:bodyPr wrap="square">
+            <a:spAutoFit/>
+          </a:bodyPr>
+          <a:lstStyle/>
+          <a:p>
+            <a:r>
+              <a:rPr lang="en-US" b="1" dirty="0">
+                <a:solidFill>
+                  <a:srgbClr val="990033"/>
+                </a:solidFill>
+              </a:rPr>
+              <a:t>E) Plot the Data from CSV using the Bokeh</a:t>
+            </a:r>
+            <a:endParaRPr lang="en-IN" b="1" dirty="0">
+              <a:solidFill>
+                <a:srgbClr val="990033"/>
+              </a:solidFill>
+            </a:endParaRPr>
+          </a:p>
+        </p:txBody>
+      </p:sp>
+      <p:sp>
+        <p:nvSpPr>
+          <p:cNvPr id="11" name="Rectangle 1">
+            <a:extLst>
+              <a:ext uri="{FF2B5EF4-FFF2-40B4-BE49-F238E27FC236}">
+                <a16:creationId xmlns:a16="http://schemas.microsoft.com/office/drawing/2014/main" id="{06BEB66A-0C31-921A-CDA8-1CCDCE9AF68D}"/>
+              </a:ext>
+            </a:extLst>
+          </p:cNvPr>
+          <p:cNvSpPr>
+            <a:spLocks noChangeArrowheads="1"/>
+          </p:cNvSpPr>
+          <p:nvPr/>
+        </p:nvSpPr>
+        <p:spPr bwMode="auto">
+          <a:xfrm>
+            <a:off x="467543" y="1437819"/>
+            <a:ext cx="7842273" cy="2769989"/>
+          </a:xfrm>
+          <a:prstGeom prst="rect">
+            <a:avLst/>
+          </a:prstGeom>
+          <a:solidFill>
+            <a:srgbClr val="FFFFFF"/>
+          </a:solidFill>
+          <a:ln>
+            <a:noFill/>
+          </a:ln>
+          <a:effectLst/>
+          <a:extLst>
+            <a:ext uri="{91240B29-F687-4F45-9708-019B960494DF}">
+              <a14:hiddenLine xmlns:a14="http://schemas.microsoft.com/office/drawing/2010/main" w="9525">
+                <a:solidFill>
+                  <a:schemeClr val="tx1"/>
+                </a:solidFill>
+                <a:miter lim="800000"/>
+                <a:headEnd/>
+                <a:tailEnd/>
+              </a14:hiddenLine>
+            </a:ext>
+            <a:ext uri="{AF507438-7753-43E0-B8FC-AC1667EBCBE1}">
+              <a14:hiddenEffects xmlns:a14="http://schemas.microsoft.com/office/drawing/2010/main">
+                <a:effectLst>
+                  <a:outerShdw dist="35921" dir="2700000" algn="ctr" rotWithShape="0">
+                    <a:schemeClr val="bg2"/>
+                  </a:outerShdw>
+                </a:effectLst>
+              </a14:hiddenEffects>
+            </a:ext>
+          </a:extLst>
+        </p:spPr>
+        <p:txBody>
+          <a:bodyPr vert="horz" wrap="square" lIns="0" tIns="0" rIns="0" bIns="0" numCol="1" anchor="ctr" anchorCtr="0" compatLnSpc="1">
+            <a:prstTxWarp prst="textNoShape">
+              <a:avLst/>
+            </a:prstTxWarp>
+            <a:spAutoFit/>
+          </a:bodyPr>
+          <a:lstStyle>
+            <a:lvl1pPr eaLnBrk="0" hangingPunct="0">
+              <a:defRPr>
+                <a:solidFill>
+                  <a:schemeClr val="tx1"/>
+                </a:solidFill>
+                <a:latin typeface="Arial" panose="020B0604020202020204" pitchFamily="34" charset="0"/>
+              </a:defRPr>
+            </a:lvl1pPr>
+            <a:lvl2pPr eaLnBrk="0" hangingPunct="0">
+              <a:defRPr>
+                <a:solidFill>
+                  <a:schemeClr val="tx1"/>
+                </a:solidFill>
+                <a:latin typeface="Arial" panose="020B0604020202020204" pitchFamily="34" charset="0"/>
+              </a:defRPr>
+            </a:lvl2pPr>
+            <a:lvl3pPr eaLnBrk="0" hangingPunct="0">
+              <a:defRPr>
+                <a:solidFill>
+                  <a:schemeClr val="tx1"/>
+                </a:solidFill>
+                <a:latin typeface="Arial" panose="020B0604020202020204" pitchFamily="34" charset="0"/>
+              </a:defRPr>
+            </a:lvl3pPr>
+            <a:lvl4pPr eaLnBrk="0" hangingPunct="0">
+              <a:defRPr>
+                <a:solidFill>
+                  <a:schemeClr val="tx1"/>
+                </a:solidFill>
+                <a:latin typeface="Arial" panose="020B0604020202020204" pitchFamily="34" charset="0"/>
+              </a:defRPr>
+            </a:lvl4pPr>
+            <a:lvl5pPr eaLnBrk="0" hangingPunct="0">
+              <a:defRPr>
+                <a:solidFill>
+                  <a:schemeClr val="tx1"/>
+                </a:solidFill>
+                <a:latin typeface="Arial" panose="020B0604020202020204" pitchFamily="34" charset="0"/>
+              </a:defRPr>
+            </a:lvl5pPr>
+            <a:lvl6pPr eaLnBrk="0" fontAlgn="base" hangingPunct="0">
+              <a:spcBef>
+                <a:spcPct val="0"/>
+              </a:spcBef>
+              <a:spcAft>
+                <a:spcPct val="0"/>
+              </a:spcAft>
+              <a:defRPr>
+                <a:solidFill>
+                  <a:schemeClr val="tx1"/>
+                </a:solidFill>
+                <a:latin typeface="Arial" panose="020B0604020202020204" pitchFamily="34" charset="0"/>
+              </a:defRPr>
+            </a:lvl6pPr>
+            <a:lvl7pPr eaLnBrk="0" fontAlgn="base" hangingPunct="0">
+              <a:spcBef>
+                <a:spcPct val="0"/>
+              </a:spcBef>
+              <a:spcAft>
+                <a:spcPct val="0"/>
+              </a:spcAft>
+              <a:defRPr>
+                <a:solidFill>
+                  <a:schemeClr val="tx1"/>
+                </a:solidFill>
+                <a:latin typeface="Arial" panose="020B0604020202020204" pitchFamily="34" charset="0"/>
+              </a:defRPr>
+            </a:lvl7pPr>
+            <a:lvl8pPr eaLnBrk="0" fontAlgn="base" hangingPunct="0">
+              <a:spcBef>
+                <a:spcPct val="0"/>
+              </a:spcBef>
+              <a:spcAft>
+                <a:spcPct val="0"/>
+              </a:spcAft>
+              <a:defRPr>
+                <a:solidFill>
+                  <a:schemeClr val="tx1"/>
+                </a:solidFill>
+                <a:latin typeface="Arial" panose="020B0604020202020204" pitchFamily="34" charset="0"/>
+              </a:defRPr>
+            </a:lvl8pPr>
+            <a:lvl9pPr eaLnBrk="0" fontAlgn="base" hangingPunct="0">
+              <a:spcBef>
+                <a:spcPct val="0"/>
+              </a:spcBef>
+              <a:spcAft>
+                <a:spcPct val="0"/>
+              </a:spcAft>
+              <a:defRPr>
+                <a:solidFill>
+                  <a:schemeClr val="tx1"/>
+                </a:solidFill>
+                <a:latin typeface="Arial" panose="020B0604020202020204" pitchFamily="34" charset="0"/>
+              </a:defRPr>
+            </a:lvl9pPr>
+          </a:lstStyle>
+          <a:p>
+            <a:pPr marL="0" marR="0" lvl="0" indent="0" algn="l" defTabSz="914400" rtl="0" eaLnBrk="0" fontAlgn="base" latinLnBrk="0" hangingPunct="0">
+              <a:lnSpc>
+                <a:spcPct val="100000"/>
+              </a:lnSpc>
+              <a:spcBef>
+                <a:spcPct val="0"/>
+              </a:spcBef>
+              <a:spcAft>
+                <a:spcPct val="0"/>
+              </a:spcAft>
+              <a:buClrTx/>
+              <a:buSzTx/>
+              <a:buFontTx/>
+              <a:buNone/>
+              <a:tabLst/>
+            </a:pPr>
+            <a:r>
+              <a:rPr kumimoji="0" lang="en-US" altLang="en-US" sz="2000" b="0" i="0" u="none" strike="noStrike" cap="none" normalizeH="0" baseline="0" dirty="0">
+                <a:ln>
+                  <a:noFill/>
+                </a:ln>
+                <a:solidFill>
+                  <a:srgbClr val="1C1D1F"/>
+                </a:solidFill>
+                <a:effectLst/>
+                <a:latin typeface="udemy sans"/>
+              </a:rPr>
+              <a:t>In the next lecture, you will learn how to load Excel files in Python with </a:t>
+            </a:r>
+            <a:r>
+              <a:rPr kumimoji="0" lang="en-US" altLang="en-US" sz="2000" b="0" i="1" u="none" strike="noStrike" cap="none" normalizeH="0" baseline="0" dirty="0">
+                <a:ln>
+                  <a:noFill/>
+                </a:ln>
+                <a:solidFill>
+                  <a:srgbClr val="1C1D1F"/>
+                </a:solidFill>
+                <a:effectLst/>
+                <a:latin typeface="udemy sans"/>
+              </a:rPr>
+              <a:t>pandas</a:t>
+            </a:r>
+            <a:r>
+              <a:rPr kumimoji="0" lang="en-US" altLang="en-US" sz="2000" b="0" i="0" u="none" strike="noStrike" cap="none" normalizeH="0" baseline="0" dirty="0">
+                <a:ln>
+                  <a:noFill/>
+                </a:ln>
+                <a:solidFill>
+                  <a:srgbClr val="1C1D1F"/>
+                </a:solidFill>
+                <a:effectLst/>
+                <a:latin typeface="udemy sans"/>
+              </a:rPr>
+              <a:t>. For this, you need </a:t>
+            </a:r>
+            <a:r>
+              <a:rPr kumimoji="0" lang="en-US" altLang="en-US" sz="2000" b="0" i="1" u="none" strike="noStrike" cap="none" normalizeH="0" baseline="0" dirty="0">
+                <a:ln>
+                  <a:noFill/>
+                </a:ln>
+                <a:solidFill>
+                  <a:srgbClr val="1C1D1F"/>
+                </a:solidFill>
+                <a:effectLst/>
+                <a:latin typeface="udemy sans"/>
+              </a:rPr>
+              <a:t>pandas</a:t>
+            </a:r>
+            <a:r>
+              <a:rPr kumimoji="0" lang="en-US" altLang="en-US" sz="2000" b="0" i="0" u="none" strike="noStrike" cap="none" normalizeH="0" baseline="0" dirty="0">
+                <a:ln>
+                  <a:noFill/>
+                </a:ln>
+                <a:solidFill>
+                  <a:srgbClr val="1C1D1F"/>
+                </a:solidFill>
+                <a:effectLst/>
+                <a:latin typeface="udemy sans"/>
+              </a:rPr>
+              <a:t> (which you have already installed) and also two other dependencies that </a:t>
+            </a:r>
+            <a:r>
+              <a:rPr kumimoji="0" lang="en-US" altLang="en-US" sz="2000" b="0" i="1" u="none" strike="noStrike" cap="none" normalizeH="0" baseline="0" dirty="0">
+                <a:ln>
+                  <a:noFill/>
+                </a:ln>
+                <a:solidFill>
+                  <a:srgbClr val="1C1D1F"/>
+                </a:solidFill>
+                <a:effectLst/>
+                <a:latin typeface="udemy sans"/>
+              </a:rPr>
+              <a:t>pandas</a:t>
+            </a:r>
+            <a:r>
+              <a:rPr kumimoji="0" lang="en-US" altLang="en-US" sz="2000" b="0" i="0" u="none" strike="noStrike" cap="none" normalizeH="0" baseline="0" dirty="0">
+                <a:ln>
+                  <a:noFill/>
+                </a:ln>
+                <a:solidFill>
+                  <a:srgbClr val="1C1D1F"/>
+                </a:solidFill>
+                <a:effectLst/>
+                <a:latin typeface="udemy sans"/>
+              </a:rPr>
+              <a:t> needs for opening Excel files. You can install them with </a:t>
+            </a:r>
+            <a:r>
+              <a:rPr kumimoji="0" lang="en-US" altLang="en-US" sz="2000" b="0" i="1" u="none" strike="noStrike" cap="none" normalizeH="0" baseline="0" dirty="0">
+                <a:ln>
+                  <a:noFill/>
+                </a:ln>
+                <a:solidFill>
+                  <a:srgbClr val="1C1D1F"/>
+                </a:solidFill>
+                <a:effectLst/>
+                <a:latin typeface="udemy sans"/>
+              </a:rPr>
+              <a:t>pip</a:t>
+            </a:r>
+            <a:r>
+              <a:rPr kumimoji="0" lang="en-US" altLang="en-US" sz="2000" b="0" i="0" u="none" strike="noStrike" cap="none" normalizeH="0" baseline="0" dirty="0">
+                <a:ln>
+                  <a:noFill/>
+                </a:ln>
+                <a:solidFill>
+                  <a:srgbClr val="1C1D1F"/>
+                </a:solidFill>
+                <a:effectLst/>
+                <a:latin typeface="udemy sans"/>
+              </a:rPr>
+              <a:t>:</a:t>
+            </a:r>
+          </a:p>
+          <a:p>
+            <a:pPr marL="0" marR="0" lvl="0" indent="0" algn="l" defTabSz="914400" rtl="0" eaLnBrk="0" fontAlgn="base" latinLnBrk="0" hangingPunct="0">
+              <a:lnSpc>
+                <a:spcPct val="100000"/>
+              </a:lnSpc>
+              <a:spcBef>
+                <a:spcPct val="0"/>
+              </a:spcBef>
+              <a:spcAft>
+                <a:spcPct val="0"/>
+              </a:spcAft>
+              <a:buClrTx/>
+              <a:buSzTx/>
+              <a:buFontTx/>
+              <a:buNone/>
+              <a:tabLst/>
+            </a:pPr>
+            <a:endParaRPr lang="en-US" altLang="en-US" sz="2000" dirty="0">
+              <a:solidFill>
+                <a:srgbClr val="1C1D1F"/>
+              </a:solidFill>
+              <a:latin typeface="udemy sans"/>
+            </a:endParaRPr>
+          </a:p>
+          <a:p>
+            <a:pPr marL="0" marR="0" lvl="0" indent="0" algn="l" defTabSz="914400" rtl="0" eaLnBrk="0" fontAlgn="base" latinLnBrk="0" hangingPunct="0">
+              <a:lnSpc>
+                <a:spcPct val="100000"/>
+              </a:lnSpc>
+              <a:spcBef>
+                <a:spcPct val="0"/>
+              </a:spcBef>
+              <a:spcAft>
+                <a:spcPct val="0"/>
+              </a:spcAft>
+              <a:buClrTx/>
+              <a:buSzTx/>
+              <a:buFontTx/>
+              <a:buNone/>
+              <a:tabLst/>
+            </a:pPr>
+            <a:r>
+              <a:rPr lang="en-US" altLang="en-US" sz="2000" b="1" dirty="0"/>
+              <a:t>Command for Installation within </a:t>
+            </a:r>
+            <a:r>
+              <a:rPr lang="en-US" altLang="en-US" sz="2000" b="1" dirty="0" err="1"/>
+              <a:t>Jupyter</a:t>
+            </a:r>
+            <a:r>
+              <a:rPr lang="en-US" altLang="en-US" sz="2000" b="1" dirty="0"/>
+              <a:t> Notebook -: </a:t>
+            </a:r>
+          </a:p>
+          <a:p>
+            <a:pPr marL="0" marR="0" lvl="0" indent="0" algn="l" defTabSz="914400" rtl="0" eaLnBrk="0" fontAlgn="base" latinLnBrk="0" hangingPunct="0">
+              <a:lnSpc>
+                <a:spcPct val="100000"/>
+              </a:lnSpc>
+              <a:spcBef>
+                <a:spcPct val="0"/>
+              </a:spcBef>
+              <a:spcAft>
+                <a:spcPct val="0"/>
+              </a:spcAft>
+              <a:buClrTx/>
+              <a:buSzTx/>
+              <a:buFontTx/>
+              <a:buNone/>
+              <a:tabLst/>
+            </a:pPr>
+            <a:endParaRPr kumimoji="0" lang="en-US" altLang="en-US" sz="2000" b="1" i="0" u="none" strike="noStrike" cap="none" normalizeH="0" baseline="0" dirty="0">
+              <a:ln>
+                <a:noFill/>
+              </a:ln>
+              <a:solidFill>
+                <a:schemeClr val="tx1"/>
+              </a:solidFill>
+              <a:effectLst/>
+            </a:endParaRPr>
+          </a:p>
+          <a:p>
+            <a:pPr marL="0" marR="0" lvl="0" indent="0" algn="l" defTabSz="914400" rtl="0" eaLnBrk="0" fontAlgn="base" latinLnBrk="0" hangingPunct="0">
+              <a:lnSpc>
+                <a:spcPct val="100000"/>
+              </a:lnSpc>
+              <a:spcBef>
+                <a:spcPct val="0"/>
+              </a:spcBef>
+              <a:spcAft>
+                <a:spcPct val="0"/>
+              </a:spcAft>
+              <a:buClrTx/>
+              <a:buSzTx/>
+              <a:buFontTx/>
+              <a:buNone/>
+              <a:tabLst/>
+            </a:pPr>
+            <a:r>
+              <a:rPr kumimoji="0" lang="en-US" altLang="en-US" sz="2000" b="0" i="0" u="none" strike="noStrike" cap="none" normalizeH="0" baseline="0" dirty="0">
+                <a:ln>
+                  <a:noFill/>
+                </a:ln>
+                <a:solidFill>
+                  <a:srgbClr val="B4690E"/>
+                </a:solidFill>
+                <a:effectLst/>
+                <a:latin typeface="sfmono-regular"/>
+              </a:rPr>
+              <a:t>! pip3.9 install </a:t>
+            </a:r>
+            <a:r>
+              <a:rPr kumimoji="0" lang="en-US" altLang="en-US" sz="2000" b="0" i="0" u="none" strike="noStrike" cap="none" normalizeH="0" baseline="0" dirty="0" err="1">
+                <a:ln>
+                  <a:noFill/>
+                </a:ln>
+                <a:solidFill>
+                  <a:srgbClr val="B4690E"/>
+                </a:solidFill>
+                <a:effectLst/>
+                <a:latin typeface="sfmono-regular"/>
+              </a:rPr>
+              <a:t>openpyxl</a:t>
+            </a:r>
+            <a:r>
+              <a:rPr kumimoji="0" lang="en-US" altLang="en-US" sz="2000" b="0" i="0" u="none" strike="noStrike" cap="none" normalizeH="0" baseline="0" dirty="0">
+                <a:ln>
+                  <a:noFill/>
+                </a:ln>
+                <a:solidFill>
+                  <a:srgbClr val="1C1D1F"/>
+                </a:solidFill>
+                <a:effectLst/>
+                <a:latin typeface="udemy sans"/>
+              </a:rPr>
+              <a:t> (needed to load Excel </a:t>
+            </a:r>
+            <a:r>
+              <a:rPr kumimoji="0" lang="en-US" altLang="en-US" sz="2000" b="0" i="1" u="none" strike="noStrike" cap="none" normalizeH="0" baseline="0" dirty="0">
+                <a:ln>
+                  <a:noFill/>
+                </a:ln>
+                <a:solidFill>
+                  <a:srgbClr val="1C1D1F"/>
+                </a:solidFill>
+                <a:effectLst/>
+                <a:latin typeface="udemy sans"/>
+              </a:rPr>
+              <a:t>.xlsx</a:t>
+            </a:r>
+            <a:r>
+              <a:rPr kumimoji="0" lang="en-US" altLang="en-US" sz="2000" b="0" i="0" u="none" strike="noStrike" cap="none" normalizeH="0" baseline="0" dirty="0">
+                <a:ln>
+                  <a:noFill/>
+                </a:ln>
+                <a:solidFill>
+                  <a:srgbClr val="1C1D1F"/>
+                </a:solidFill>
+                <a:effectLst/>
+                <a:latin typeface="udemy sans"/>
+              </a:rPr>
+              <a:t> files)</a:t>
+            </a:r>
+            <a:endParaRPr kumimoji="0" lang="en-US" altLang="en-US" sz="2000" b="0" i="0" u="none" strike="noStrike" cap="none" normalizeH="0" baseline="0" dirty="0">
+              <a:ln>
+                <a:noFill/>
+              </a:ln>
+              <a:solidFill>
+                <a:schemeClr val="tx1"/>
+              </a:solidFill>
+              <a:effectLst/>
+            </a:endParaRPr>
+          </a:p>
+          <a:p>
+            <a:pPr marL="0" marR="0" lvl="0" indent="0" algn="l" defTabSz="914400" rtl="0" eaLnBrk="0" fontAlgn="base" latinLnBrk="0" hangingPunct="0">
+              <a:lnSpc>
+                <a:spcPct val="100000"/>
+              </a:lnSpc>
+              <a:spcBef>
+                <a:spcPct val="0"/>
+              </a:spcBef>
+              <a:spcAft>
+                <a:spcPct val="0"/>
+              </a:spcAft>
+              <a:buClrTx/>
+              <a:buSzTx/>
+              <a:buFontTx/>
+              <a:buNone/>
+              <a:tabLst/>
+            </a:pPr>
+            <a:r>
+              <a:rPr kumimoji="0" lang="en-US" altLang="en-US" sz="2000" b="0" i="0" u="none" strike="noStrike" cap="none" normalizeH="0" baseline="0" dirty="0">
+                <a:ln>
+                  <a:noFill/>
+                </a:ln>
+                <a:solidFill>
+                  <a:srgbClr val="B4690E"/>
+                </a:solidFill>
+                <a:effectLst/>
+                <a:latin typeface="sfmono-regular"/>
+              </a:rPr>
+              <a:t>! pip3.9 install </a:t>
+            </a:r>
+            <a:r>
+              <a:rPr kumimoji="0" lang="en-US" altLang="en-US" sz="2000" b="0" i="0" u="none" strike="noStrike" cap="none" normalizeH="0" baseline="0" dirty="0" err="1">
+                <a:ln>
+                  <a:noFill/>
+                </a:ln>
+                <a:solidFill>
+                  <a:srgbClr val="B4690E"/>
+                </a:solidFill>
+                <a:effectLst/>
+                <a:latin typeface="sfmono-regular"/>
+              </a:rPr>
+              <a:t>xlrd</a:t>
+            </a:r>
+            <a:r>
+              <a:rPr kumimoji="0" lang="en-US" altLang="en-US" sz="2000" b="0" i="0" u="none" strike="noStrike" cap="none" normalizeH="0" baseline="0" dirty="0">
+                <a:ln>
+                  <a:noFill/>
+                </a:ln>
+                <a:solidFill>
+                  <a:srgbClr val="1C1D1F"/>
+                </a:solidFill>
+                <a:effectLst/>
+                <a:latin typeface="udemy sans"/>
+              </a:rPr>
+              <a:t> (needed to load Excel old </a:t>
+            </a:r>
+            <a:r>
+              <a:rPr kumimoji="0" lang="en-US" altLang="en-US" sz="2000" b="0" i="1" u="none" strike="noStrike" cap="none" normalizeH="0" baseline="0" dirty="0">
+                <a:ln>
+                  <a:noFill/>
+                </a:ln>
+                <a:solidFill>
+                  <a:srgbClr val="1C1D1F"/>
+                </a:solidFill>
+                <a:effectLst/>
+                <a:latin typeface="udemy sans"/>
+              </a:rPr>
+              <a:t>.</a:t>
+            </a:r>
+            <a:r>
+              <a:rPr kumimoji="0" lang="en-US" altLang="en-US" sz="2000" b="0" i="1" u="none" strike="noStrike" cap="none" normalizeH="0" baseline="0" dirty="0" err="1">
+                <a:ln>
+                  <a:noFill/>
+                </a:ln>
+                <a:solidFill>
+                  <a:srgbClr val="1C1D1F"/>
+                </a:solidFill>
+                <a:effectLst/>
+                <a:latin typeface="udemy sans"/>
+              </a:rPr>
+              <a:t>xls</a:t>
+            </a:r>
+            <a:r>
+              <a:rPr kumimoji="0" lang="en-US" altLang="en-US" sz="2000" b="0" i="0" u="none" strike="noStrike" cap="none" normalizeH="0" baseline="0" dirty="0">
+                <a:ln>
+                  <a:noFill/>
+                </a:ln>
+                <a:solidFill>
+                  <a:srgbClr val="1C1D1F"/>
+                </a:solidFill>
+                <a:effectLst/>
+                <a:latin typeface="udemy sans"/>
+              </a:rPr>
+              <a:t> files)</a:t>
+            </a:r>
+            <a:endParaRPr kumimoji="0" lang="en-US" altLang="en-US" sz="2000" b="0" i="0" u="none" strike="noStrike" cap="none" normalizeH="0" baseline="0" dirty="0">
+              <a:ln>
+                <a:noFill/>
+              </a:ln>
+              <a:solidFill>
+                <a:schemeClr val="tx1"/>
+              </a:solidFill>
+              <a:effectLst/>
+              <a:latin typeface="Arial" panose="020B0604020202020204" pitchFamily="34" charset="0"/>
+            </a:endParaRPr>
+          </a:p>
+        </p:txBody>
+      </p:sp>
+    </p:spTree>
+    <p:extLst>
+      <p:ext uri="{BB962C8B-B14F-4D97-AF65-F5344CB8AC3E}">
+        <p14:creationId xmlns:p14="http://schemas.microsoft.com/office/powerpoint/2010/main" val="2827145370"/>
       </p:ext>
     </p:extLst>
   </p:cSld>

</xml_diff>